<commit_message>
Aula 2 e ajustes
</commit_message>
<xml_diff>
--- a/Slides/java_aprendizado_1.pptx
+++ b/Slides/java_aprendizado_1.pptx
@@ -150,15 +150,6 @@
     </p:ext>
   </p:extLst>
 </p:presentation>
-</file>
-
-<file path=ppt/revisionInfo.xml><?xml version="1.0" encoding="utf-8"?>
-<p1510:revInfo xmlns:a="http://schemas.openxmlformats.org/drawingml/2006/main" xmlns:r="http://schemas.openxmlformats.org/officeDocument/2006/relationships" xmlns:p1510="http://schemas.microsoft.com/office/powerpoint/2015/10/main">
-  <p1510:revLst>
-    <p1510:client id="{45E38AC1-4B67-4187-9BEB-E7926C471F70}" v="156" dt="2021-09-25T17:46:50.593"/>
-    <p1510:client id="{9E9555B7-9CC0-4A90-8E53-6CA91695EA33}" v="52" dt="2021-09-25T03:37:25.314"/>
-  </p1510:revLst>
-</p1510:revInfo>
 </file>
 
 <file path=ppt/changesInfos/changesInfo1.xml><?xml version="1.0" encoding="utf-8"?>
@@ -2139,6 +2130,22 @@
       </pc:sldChg>
     </pc:docChg>
   </pc:docChgLst>
+  <pc:docChgLst>
+    <pc:chgData name="Sidnei Gomes de Almeida Junior" userId="eec3f0bb295ba151" providerId="LiveId" clId="{485AD433-79C5-4292-BAFF-E4A3900F793F}"/>
+    <pc:docChg chg="modSld sldOrd">
+      <pc:chgData name="Sidnei Gomes de Almeida Junior" userId="eec3f0bb295ba151" providerId="LiveId" clId="{485AD433-79C5-4292-BAFF-E4A3900F793F}" dt="2021-10-02T16:25:42.096" v="1"/>
+      <pc:docMkLst>
+        <pc:docMk/>
+      </pc:docMkLst>
+      <pc:sldChg chg="ord">
+        <pc:chgData name="Sidnei Gomes de Almeida Junior" userId="eec3f0bb295ba151" providerId="LiveId" clId="{485AD433-79C5-4292-BAFF-E4A3900F793F}" dt="2021-10-02T16:25:42.096" v="1"/>
+        <pc:sldMkLst>
+          <pc:docMk/>
+          <pc:sldMk cId="660417573" sldId="268"/>
+        </pc:sldMkLst>
+      </pc:sldChg>
+    </pc:docChg>
+  </pc:docChgLst>
 </pc:chgInfo>
 </file>
 
@@ -2224,7 +2231,7 @@
           <a:p>
             <a:fld id="{645FBA11-369E-42FD-ADDD-509D8CFD7B21}" type="datetimeFigureOut">
               <a:rPr lang="pt-BR" smtClean="0"/>
-              <a:t>25/09/2021</a:t>
+              <a:t>02/10/2021</a:t>
             </a:fld>
             <a:endParaRPr lang="pt-BR"/>
           </a:p>
@@ -3301,7 +3308,7 @@
           <a:p>
             <a:fld id="{3A2F720F-32C2-4E6A-BEE6-680F2789BE1C}" type="datetimeFigureOut">
               <a:rPr lang="pt-BR" smtClean="0"/>
-              <a:t>25/09/2021</a:t>
+              <a:t>02/10/2021</a:t>
             </a:fld>
             <a:endParaRPr lang="pt-BR"/>
           </a:p>
@@ -3552,7 +3559,7 @@
           <a:p>
             <a:fld id="{3A2F720F-32C2-4E6A-BEE6-680F2789BE1C}" type="datetimeFigureOut">
               <a:rPr lang="pt-BR" smtClean="0"/>
-              <a:t>25/09/2021</a:t>
+              <a:t>02/10/2021</a:t>
             </a:fld>
             <a:endParaRPr lang="pt-BR"/>
           </a:p>
@@ -3866,7 +3873,7 @@
           <a:p>
             <a:fld id="{3A2F720F-32C2-4E6A-BEE6-680F2789BE1C}" type="datetimeFigureOut">
               <a:rPr lang="pt-BR" smtClean="0"/>
-              <a:t>25/09/2021</a:t>
+              <a:t>02/10/2021</a:t>
             </a:fld>
             <a:endParaRPr lang="pt-BR"/>
           </a:p>
@@ -4193,7 +4200,7 @@
           <a:p>
             <a:fld id="{3A2F720F-32C2-4E6A-BEE6-680F2789BE1C}" type="datetimeFigureOut">
               <a:rPr lang="pt-BR" smtClean="0"/>
-              <a:t>25/09/2021</a:t>
+              <a:t>02/10/2021</a:t>
             </a:fld>
             <a:endParaRPr lang="pt-BR"/>
           </a:p>
@@ -4507,7 +4514,7 @@
           <a:p>
             <a:fld id="{3A2F720F-32C2-4E6A-BEE6-680F2789BE1C}" type="datetimeFigureOut">
               <a:rPr lang="pt-BR" smtClean="0"/>
-              <a:t>25/09/2021</a:t>
+              <a:t>02/10/2021</a:t>
             </a:fld>
             <a:endParaRPr lang="pt-BR"/>
           </a:p>
@@ -4894,7 +4901,7 @@
           <a:p>
             <a:fld id="{3A2F720F-32C2-4E6A-BEE6-680F2789BE1C}" type="datetimeFigureOut">
               <a:rPr lang="pt-BR" smtClean="0"/>
-              <a:t>25/09/2021</a:t>
+              <a:t>02/10/2021</a:t>
             </a:fld>
             <a:endParaRPr lang="pt-BR"/>
           </a:p>
@@ -5064,7 +5071,7 @@
           <a:p>
             <a:fld id="{3A2F720F-32C2-4E6A-BEE6-680F2789BE1C}" type="datetimeFigureOut">
               <a:rPr lang="pt-BR" smtClean="0"/>
-              <a:t>25/09/2021</a:t>
+              <a:t>02/10/2021</a:t>
             </a:fld>
             <a:endParaRPr lang="pt-BR"/>
           </a:p>
@@ -5244,7 +5251,7 @@
           <a:p>
             <a:fld id="{3A2F720F-32C2-4E6A-BEE6-680F2789BE1C}" type="datetimeFigureOut">
               <a:rPr lang="pt-BR" smtClean="0"/>
-              <a:t>25/09/2021</a:t>
+              <a:t>02/10/2021</a:t>
             </a:fld>
             <a:endParaRPr lang="pt-BR"/>
           </a:p>
@@ -5414,7 +5421,7 @@
           <a:p>
             <a:fld id="{3A2F720F-32C2-4E6A-BEE6-680F2789BE1C}" type="datetimeFigureOut">
               <a:rPr lang="pt-BR" smtClean="0"/>
-              <a:t>25/09/2021</a:t>
+              <a:t>02/10/2021</a:t>
             </a:fld>
             <a:endParaRPr lang="pt-BR"/>
           </a:p>
@@ -5661,7 +5668,7 @@
           <a:p>
             <a:fld id="{3A2F720F-32C2-4E6A-BEE6-680F2789BE1C}" type="datetimeFigureOut">
               <a:rPr lang="pt-BR" smtClean="0"/>
-              <a:t>25/09/2021</a:t>
+              <a:t>02/10/2021</a:t>
             </a:fld>
             <a:endParaRPr lang="pt-BR"/>
           </a:p>
@@ -5893,7 +5900,7 @@
           <a:p>
             <a:fld id="{3A2F720F-32C2-4E6A-BEE6-680F2789BE1C}" type="datetimeFigureOut">
               <a:rPr lang="pt-BR" smtClean="0"/>
-              <a:t>25/09/2021</a:t>
+              <a:t>02/10/2021</a:t>
             </a:fld>
             <a:endParaRPr lang="pt-BR"/>
           </a:p>
@@ -6267,7 +6274,7 @@
           <a:p>
             <a:fld id="{3A2F720F-32C2-4E6A-BEE6-680F2789BE1C}" type="datetimeFigureOut">
               <a:rPr lang="pt-BR" smtClean="0"/>
-              <a:t>25/09/2021</a:t>
+              <a:t>02/10/2021</a:t>
             </a:fld>
             <a:endParaRPr lang="pt-BR"/>
           </a:p>
@@ -6390,7 +6397,7 @@
           <a:p>
             <a:fld id="{3A2F720F-32C2-4E6A-BEE6-680F2789BE1C}" type="datetimeFigureOut">
               <a:rPr lang="pt-BR" smtClean="0"/>
-              <a:t>25/09/2021</a:t>
+              <a:t>02/10/2021</a:t>
             </a:fld>
             <a:endParaRPr lang="pt-BR"/>
           </a:p>
@@ -6485,7 +6492,7 @@
           <a:p>
             <a:fld id="{3A2F720F-32C2-4E6A-BEE6-680F2789BE1C}" type="datetimeFigureOut">
               <a:rPr lang="pt-BR" smtClean="0"/>
-              <a:t>25/09/2021</a:t>
+              <a:t>02/10/2021</a:t>
             </a:fld>
             <a:endParaRPr lang="pt-BR"/>
           </a:p>
@@ -6740,7 +6747,7 @@
           <a:p>
             <a:fld id="{3A2F720F-32C2-4E6A-BEE6-680F2789BE1C}" type="datetimeFigureOut">
               <a:rPr lang="pt-BR" smtClean="0"/>
-              <a:t>25/09/2021</a:t>
+              <a:t>02/10/2021</a:t>
             </a:fld>
             <a:endParaRPr lang="pt-BR"/>
           </a:p>
@@ -7003,7 +7010,7 @@
           <a:p>
             <a:fld id="{3A2F720F-32C2-4E6A-BEE6-680F2789BE1C}" type="datetimeFigureOut">
               <a:rPr lang="pt-BR" smtClean="0"/>
-              <a:t>25/09/2021</a:t>
+              <a:t>02/10/2021</a:t>
             </a:fld>
             <a:endParaRPr lang="pt-BR"/>
           </a:p>
@@ -7748,7 +7755,7 @@
           <a:p>
             <a:fld id="{3A2F720F-32C2-4E6A-BEE6-680F2789BE1C}" type="datetimeFigureOut">
               <a:rPr lang="pt-BR" smtClean="0"/>
-              <a:t>25/09/2021</a:t>
+              <a:t>02/10/2021</a:t>
             </a:fld>
             <a:endParaRPr lang="pt-BR"/>
           </a:p>

</xml_diff>